<commit_message>
## Update of Diagram in addressbook-level2 * Change of new Diagram due to new interface Printable
</commit_message>
<xml_diff>
--- a/doc/Diagrams.pptx
+++ b/doc/Diagrams.pptx
@@ -6,7 +6,7 @@
   </p:sldMasterIdLst>
   <p:sldIdLst>
     <p:sldId id="256" r:id="rId2"/>
-    <p:sldId id="257" r:id="rId3"/>
+    <p:sldId id="259" r:id="rId3"/>
     <p:sldId id="258" r:id="rId4"/>
   </p:sldIdLst>
   <p:sldSz cx="9144000" cy="6858000" type="screen4x3"/>
@@ -106,6 +106,22 @@
       </a:defRPr>
     </a:lvl9pPr>
   </p:defaultTextStyle>
+  <p:extLst>
+    <p:ext uri="{EFAFB233-063F-42B5-8137-9DF3F51BA10A}">
+      <p15:sldGuideLst xmlns:p15="http://schemas.microsoft.com/office/powerpoint/2012/main">
+        <p15:guide id="1" orient="horz" pos="2160">
+          <p15:clr>
+            <a:srgbClr val="A4A3A4"/>
+          </p15:clr>
+        </p15:guide>
+        <p15:guide id="2" pos="2880">
+          <p15:clr>
+            <a:srgbClr val="A4A3A4"/>
+          </p15:clr>
+        </p15:guide>
+      </p15:sldGuideLst>
+    </p:ext>
+  </p:extLst>
 </p:presentation>
 </file>
 
@@ -290,7 +306,7 @@
           <a:p>
             <a:fld id="{78C97017-6FC3-485B-9764-EAC9E56C1D49}" type="datetimeFigureOut">
               <a:rPr lang="en-US" smtClean="0"/>
-              <a:t>8/28/2016</a:t>
+              <a:t>9/5/16</a:t>
             </a:fld>
             <a:endParaRPr lang="en-US"/>
           </a:p>
@@ -460,7 +476,7 @@
           <a:p>
             <a:fld id="{78C97017-6FC3-485B-9764-EAC9E56C1D49}" type="datetimeFigureOut">
               <a:rPr lang="en-US" smtClean="0"/>
-              <a:t>8/28/2016</a:t>
+              <a:t>9/5/16</a:t>
             </a:fld>
             <a:endParaRPr lang="en-US"/>
           </a:p>
@@ -640,7 +656,7 @@
           <a:p>
             <a:fld id="{78C97017-6FC3-485B-9764-EAC9E56C1D49}" type="datetimeFigureOut">
               <a:rPr lang="en-US" smtClean="0"/>
-              <a:t>8/28/2016</a:t>
+              <a:t>9/5/16</a:t>
             </a:fld>
             <a:endParaRPr lang="en-US"/>
           </a:p>
@@ -810,7 +826,7 @@
           <a:p>
             <a:fld id="{78C97017-6FC3-485B-9764-EAC9E56C1D49}" type="datetimeFigureOut">
               <a:rPr lang="en-US" smtClean="0"/>
-              <a:t>8/28/2016</a:t>
+              <a:t>9/5/16</a:t>
             </a:fld>
             <a:endParaRPr lang="en-US"/>
           </a:p>
@@ -1056,7 +1072,7 @@
           <a:p>
             <a:fld id="{78C97017-6FC3-485B-9764-EAC9E56C1D49}" type="datetimeFigureOut">
               <a:rPr lang="en-US" smtClean="0"/>
-              <a:t>8/28/2016</a:t>
+              <a:t>9/5/16</a:t>
             </a:fld>
             <a:endParaRPr lang="en-US"/>
           </a:p>
@@ -1344,7 +1360,7 @@
           <a:p>
             <a:fld id="{78C97017-6FC3-485B-9764-EAC9E56C1D49}" type="datetimeFigureOut">
               <a:rPr lang="en-US" smtClean="0"/>
-              <a:t>8/28/2016</a:t>
+              <a:t>9/5/16</a:t>
             </a:fld>
             <a:endParaRPr lang="en-US"/>
           </a:p>
@@ -1766,7 +1782,7 @@
           <a:p>
             <a:fld id="{78C97017-6FC3-485B-9764-EAC9E56C1D49}" type="datetimeFigureOut">
               <a:rPr lang="en-US" smtClean="0"/>
-              <a:t>8/28/2016</a:t>
+              <a:t>9/5/16</a:t>
             </a:fld>
             <a:endParaRPr lang="en-US"/>
           </a:p>
@@ -1884,7 +1900,7 @@
           <a:p>
             <a:fld id="{78C97017-6FC3-485B-9764-EAC9E56C1D49}" type="datetimeFigureOut">
               <a:rPr lang="en-US" smtClean="0"/>
-              <a:t>8/28/2016</a:t>
+              <a:t>9/5/16</a:t>
             </a:fld>
             <a:endParaRPr lang="en-US"/>
           </a:p>
@@ -1979,7 +1995,7 @@
           <a:p>
             <a:fld id="{78C97017-6FC3-485B-9764-EAC9E56C1D49}" type="datetimeFigureOut">
               <a:rPr lang="en-US" smtClean="0"/>
-              <a:t>8/28/2016</a:t>
+              <a:t>9/5/16</a:t>
             </a:fld>
             <a:endParaRPr lang="en-US"/>
           </a:p>
@@ -2256,7 +2272,7 @@
           <a:p>
             <a:fld id="{78C97017-6FC3-485B-9764-EAC9E56C1D49}" type="datetimeFigureOut">
               <a:rPr lang="en-US" smtClean="0"/>
-              <a:t>8/28/2016</a:t>
+              <a:t>9/5/16</a:t>
             </a:fld>
             <a:endParaRPr lang="en-US"/>
           </a:p>
@@ -2509,7 +2525,7 @@
           <a:p>
             <a:fld id="{78C97017-6FC3-485B-9764-EAC9E56C1D49}" type="datetimeFigureOut">
               <a:rPr lang="en-US" smtClean="0"/>
-              <a:t>8/28/2016</a:t>
+              <a:t>9/5/16</a:t>
             </a:fld>
             <a:endParaRPr lang="en-US"/>
           </a:p>
@@ -2722,7 +2738,7 @@
           <a:p>
             <a:fld id="{78C97017-6FC3-485B-9764-EAC9E56C1D49}" type="datetimeFigureOut">
               <a:rPr lang="en-US" smtClean="0"/>
-              <a:t>8/28/2016</a:t>
+              <a:t>9/5/16</a:t>
             </a:fld>
             <a:endParaRPr lang="en-US"/>
           </a:p>
@@ -3177,2593 +3193,39 @@
           <a:chExt cx="0" cy="0"/>
         </a:xfrm>
       </p:grpSpPr>
-      <p:sp>
-        <p:nvSpPr>
-          <p:cNvPr id="9" name="Rectangle 8"/>
-          <p:cNvSpPr/>
-          <p:nvPr/>
-        </p:nvSpPr>
+      <p:pic>
+        <p:nvPicPr>
+          <p:cNvPr id="4" name="Content Placeholder 3"/>
+          <p:cNvPicPr>
+            <a:picLocks noGrp="1" noChangeAspect="1"/>
+          </p:cNvPicPr>
+          <p:nvPr>
+            <p:ph idx="1"/>
+          </p:nvPr>
+        </p:nvPicPr>
+        <p:blipFill>
+          <a:blip r:embed="rId2">
+            <a:extLst>
+              <a:ext uri="{28A0092B-C50C-407E-A947-70E740481C1C}">
+                <a14:useLocalDpi xmlns:a14="http://schemas.microsoft.com/office/drawing/2010/main" val="0"/>
+              </a:ext>
+            </a:extLst>
+          </a:blip>
+          <a:stretch>
+            <a:fillRect/>
+          </a:stretch>
+        </p:blipFill>
         <p:spPr>
           <a:xfrm>
-            <a:off x="761999" y="5141640"/>
-            <a:ext cx="929296" cy="346760"/>
+            <a:off x="533400" y="1066800"/>
+            <a:ext cx="8037314" cy="4525963"/>
           </a:xfrm>
-          <a:prstGeom prst="rect">
-            <a:avLst/>
-          </a:prstGeom>
-          <a:ln w="19050"/>
-          <a:effectLst/>
         </p:spPr>
-        <p:style>
-          <a:lnRef idx="1">
-            <a:schemeClr val="accent2"/>
-          </a:lnRef>
-          <a:fillRef idx="2">
-            <a:schemeClr val="accent2"/>
-          </a:fillRef>
-          <a:effectRef idx="1">
-            <a:schemeClr val="accent2"/>
-          </a:effectRef>
-          <a:fontRef idx="minor">
-            <a:schemeClr val="dk1"/>
-          </a:fontRef>
-        </p:style>
-        <p:txBody>
-          <a:bodyPr rtlCol="0" anchor="ctr"/>
-          <a:lstStyle/>
-          <a:p>
-            <a:pPr algn="ctr"/>
-            <a:r>
-              <a:rPr lang="en-US" sz="1050" dirty="0" err="1" smtClean="0"/>
-              <a:t>TextUi</a:t>
-            </a:r>
-            <a:endParaRPr lang="en-SG" sz="1050" dirty="0"/>
-          </a:p>
-        </p:txBody>
-      </p:sp>
-      <p:sp>
-        <p:nvSpPr>
-          <p:cNvPr id="12" name="Rectangle 11"/>
-          <p:cNvSpPr/>
-          <p:nvPr/>
-        </p:nvSpPr>
-        <p:spPr>
-          <a:xfrm>
-            <a:off x="762000" y="3747060"/>
-            <a:ext cx="929296" cy="346760"/>
-          </a:xfrm>
-          <a:prstGeom prst="rect">
-            <a:avLst/>
-          </a:prstGeom>
-          <a:solidFill>
-            <a:srgbClr val="C00000"/>
-          </a:solidFill>
-          <a:ln w="19050">
-            <a:solidFill>
-              <a:srgbClr val="C00000"/>
-            </a:solidFill>
-          </a:ln>
-          <a:effectLst/>
-        </p:spPr>
-        <p:style>
-          <a:lnRef idx="1">
-            <a:schemeClr val="accent2"/>
-          </a:lnRef>
-          <a:fillRef idx="2">
-            <a:schemeClr val="accent2"/>
-          </a:fillRef>
-          <a:effectRef idx="1">
-            <a:schemeClr val="accent2"/>
-          </a:effectRef>
-          <a:fontRef idx="minor">
-            <a:schemeClr val="dk1"/>
-          </a:fontRef>
-        </p:style>
-        <p:txBody>
-          <a:bodyPr rtlCol="0" anchor="ctr"/>
-          <a:lstStyle/>
-          <a:p>
-            <a:pPr algn="ctr"/>
-            <a:r>
-              <a:rPr lang="en-US" sz="1050" dirty="0" smtClean="0">
-                <a:solidFill>
-                  <a:schemeClr val="bg1"/>
-                </a:solidFill>
-              </a:rPr>
-              <a:t>Main</a:t>
-            </a:r>
-            <a:endParaRPr lang="en-SG" sz="1050" dirty="0">
-              <a:solidFill>
-                <a:schemeClr val="bg1"/>
-              </a:solidFill>
-            </a:endParaRPr>
-          </a:p>
-        </p:txBody>
-      </p:sp>
-      <p:sp>
-        <p:nvSpPr>
-          <p:cNvPr id="13" name="Rectangle 12"/>
-          <p:cNvSpPr/>
-          <p:nvPr/>
-        </p:nvSpPr>
-        <p:spPr>
-          <a:xfrm>
-            <a:off x="2064848" y="3747060"/>
-            <a:ext cx="929296" cy="346760"/>
-          </a:xfrm>
-          <a:prstGeom prst="rect">
-            <a:avLst/>
-          </a:prstGeom>
-          <a:ln w="19050"/>
-          <a:effectLst/>
-        </p:spPr>
-        <p:style>
-          <a:lnRef idx="1">
-            <a:schemeClr val="accent6"/>
-          </a:lnRef>
-          <a:fillRef idx="2">
-            <a:schemeClr val="accent6"/>
-          </a:fillRef>
-          <a:effectRef idx="1">
-            <a:schemeClr val="accent6"/>
-          </a:effectRef>
-          <a:fontRef idx="minor">
-            <a:schemeClr val="dk1"/>
-          </a:fontRef>
-        </p:style>
-        <p:txBody>
-          <a:bodyPr rtlCol="0" anchor="ctr"/>
-          <a:lstStyle/>
-          <a:p>
-            <a:pPr algn="ctr"/>
-            <a:r>
-              <a:rPr lang="en-US" sz="1050" dirty="0" err="1"/>
-              <a:t>AddressBook</a:t>
-            </a:r>
-            <a:endParaRPr lang="en-SG" sz="1050" dirty="0"/>
-          </a:p>
-        </p:txBody>
-      </p:sp>
-      <p:sp>
-        <p:nvSpPr>
-          <p:cNvPr id="14" name="Rectangle 13"/>
-          <p:cNvSpPr/>
-          <p:nvPr/>
-        </p:nvSpPr>
-        <p:spPr>
-          <a:xfrm>
-            <a:off x="1447800" y="3006040"/>
-            <a:ext cx="634723" cy="346760"/>
-          </a:xfrm>
-          <a:prstGeom prst="rect">
-            <a:avLst/>
-          </a:prstGeom>
-          <a:ln w="19050"/>
-          <a:effectLst/>
-        </p:spPr>
-        <p:style>
-          <a:lnRef idx="1">
-            <a:schemeClr val="accent2"/>
-          </a:lnRef>
-          <a:fillRef idx="2">
-            <a:schemeClr val="accent2"/>
-          </a:fillRef>
-          <a:effectRef idx="1">
-            <a:schemeClr val="accent2"/>
-          </a:effectRef>
-          <a:fontRef idx="minor">
-            <a:schemeClr val="dk1"/>
-          </a:fontRef>
-        </p:style>
-        <p:txBody>
-          <a:bodyPr rtlCol="0" anchor="ctr"/>
-          <a:lstStyle/>
-          <a:p>
-            <a:pPr algn="ctr"/>
-            <a:r>
-              <a:rPr lang="en-US" sz="1050" dirty="0" smtClean="0"/>
-              <a:t>Parser</a:t>
-            </a:r>
-            <a:endParaRPr lang="en-SG" sz="1050" dirty="0"/>
-          </a:p>
-        </p:txBody>
-      </p:sp>
-      <p:sp>
-        <p:nvSpPr>
-          <p:cNvPr id="15" name="Rectangle 14"/>
-          <p:cNvSpPr/>
-          <p:nvPr/>
-        </p:nvSpPr>
-        <p:spPr>
-          <a:xfrm>
-            <a:off x="3681046" y="3032560"/>
-            <a:ext cx="929296" cy="346760"/>
-          </a:xfrm>
-          <a:prstGeom prst="rect">
-            <a:avLst/>
-          </a:prstGeom>
-          <a:ln w="19050"/>
-          <a:effectLst/>
-        </p:spPr>
-        <p:style>
-          <a:lnRef idx="1">
-            <a:schemeClr val="accent6"/>
-          </a:lnRef>
-          <a:fillRef idx="2">
-            <a:schemeClr val="accent6"/>
-          </a:fillRef>
-          <a:effectRef idx="1">
-            <a:schemeClr val="accent6"/>
-          </a:effectRef>
-          <a:fontRef idx="minor">
-            <a:schemeClr val="dk1"/>
-          </a:fontRef>
-        </p:style>
-        <p:txBody>
-          <a:bodyPr rtlCol="0" anchor="ctr"/>
-          <a:lstStyle/>
-          <a:p>
-            <a:pPr algn="ctr"/>
-            <a:r>
-              <a:rPr lang="en-US" sz="1050" dirty="0" smtClean="0"/>
-              <a:t>Unique</a:t>
-            </a:r>
-            <a:br>
-              <a:rPr lang="en-US" sz="1050" dirty="0" smtClean="0"/>
-            </a:br>
-            <a:r>
-              <a:rPr lang="en-US" sz="1050" dirty="0" err="1" smtClean="0"/>
-              <a:t>TagList</a:t>
-            </a:r>
-            <a:endParaRPr lang="en-SG" sz="1050" dirty="0"/>
-          </a:p>
-        </p:txBody>
-      </p:sp>
-      <p:sp>
-        <p:nvSpPr>
-          <p:cNvPr id="16" name="Rectangle 15"/>
-          <p:cNvSpPr/>
-          <p:nvPr/>
-        </p:nvSpPr>
-        <p:spPr>
-          <a:xfrm>
-            <a:off x="3654669" y="4352685"/>
-            <a:ext cx="929296" cy="346760"/>
-          </a:xfrm>
-          <a:prstGeom prst="rect">
-            <a:avLst/>
-          </a:prstGeom>
-          <a:ln w="19050"/>
-          <a:effectLst/>
-        </p:spPr>
-        <p:style>
-          <a:lnRef idx="1">
-            <a:schemeClr val="accent6"/>
-          </a:lnRef>
-          <a:fillRef idx="2">
-            <a:schemeClr val="accent6"/>
-          </a:fillRef>
-          <a:effectRef idx="1">
-            <a:schemeClr val="accent6"/>
-          </a:effectRef>
-          <a:fontRef idx="minor">
-            <a:schemeClr val="dk1"/>
-          </a:fontRef>
-        </p:style>
-        <p:txBody>
-          <a:bodyPr rtlCol="0" anchor="ctr"/>
-          <a:lstStyle/>
-          <a:p>
-            <a:pPr algn="ctr"/>
-            <a:r>
-              <a:rPr lang="en-US" sz="1050" dirty="0" smtClean="0"/>
-              <a:t>Unique</a:t>
-            </a:r>
-            <a:br>
-              <a:rPr lang="en-US" sz="1050" dirty="0" smtClean="0"/>
-            </a:br>
-            <a:r>
-              <a:rPr lang="en-US" sz="1050" dirty="0" err="1" smtClean="0"/>
-              <a:t>PersonList</a:t>
-            </a:r>
-            <a:endParaRPr lang="en-SG" sz="1050" dirty="0"/>
-          </a:p>
-        </p:txBody>
-      </p:sp>
-      <p:sp>
-        <p:nvSpPr>
-          <p:cNvPr id="19" name="Rectangle 18"/>
-          <p:cNvSpPr/>
-          <p:nvPr/>
-        </p:nvSpPr>
-        <p:spPr>
-          <a:xfrm>
-            <a:off x="5219458" y="4352685"/>
-            <a:ext cx="929296" cy="346760"/>
-          </a:xfrm>
-          <a:prstGeom prst="rect">
-            <a:avLst/>
-          </a:prstGeom>
-          <a:ln w="19050"/>
-          <a:effectLst/>
-        </p:spPr>
-        <p:style>
-          <a:lnRef idx="1">
-            <a:schemeClr val="accent6"/>
-          </a:lnRef>
-          <a:fillRef idx="2">
-            <a:schemeClr val="accent6"/>
-          </a:fillRef>
-          <a:effectRef idx="1">
-            <a:schemeClr val="accent6"/>
-          </a:effectRef>
-          <a:fontRef idx="minor">
-            <a:schemeClr val="dk1"/>
-          </a:fontRef>
-        </p:style>
-        <p:txBody>
-          <a:bodyPr rtlCol="0" anchor="ctr"/>
-          <a:lstStyle/>
-          <a:p>
-            <a:pPr algn="ctr"/>
-            <a:r>
-              <a:rPr lang="en-US" sz="1050" dirty="0" smtClean="0"/>
-              <a:t>Person</a:t>
-            </a:r>
-            <a:endParaRPr lang="en-SG" sz="1050" dirty="0"/>
-          </a:p>
-        </p:txBody>
-      </p:sp>
-      <p:sp>
-        <p:nvSpPr>
-          <p:cNvPr id="20" name="Rectangle 19"/>
-          <p:cNvSpPr/>
-          <p:nvPr/>
-        </p:nvSpPr>
-        <p:spPr>
-          <a:xfrm>
-            <a:off x="6781800" y="4036277"/>
-            <a:ext cx="929296" cy="346760"/>
-          </a:xfrm>
-          <a:prstGeom prst="rect">
-            <a:avLst/>
-          </a:prstGeom>
-          <a:ln w="19050"/>
-          <a:effectLst/>
-        </p:spPr>
-        <p:style>
-          <a:lnRef idx="1">
-            <a:schemeClr val="accent4"/>
-          </a:lnRef>
-          <a:fillRef idx="2">
-            <a:schemeClr val="accent4"/>
-          </a:fillRef>
-          <a:effectRef idx="1">
-            <a:schemeClr val="accent4"/>
-          </a:effectRef>
-          <a:fontRef idx="minor">
-            <a:schemeClr val="dk1"/>
-          </a:fontRef>
-        </p:style>
-        <p:txBody>
-          <a:bodyPr rtlCol="0" anchor="ctr"/>
-          <a:lstStyle/>
-          <a:p>
-            <a:pPr algn="ctr"/>
-            <a:r>
-              <a:rPr lang="en-US" sz="1050" dirty="0" smtClean="0"/>
-              <a:t>Phone</a:t>
-            </a:r>
-            <a:endParaRPr lang="en-SG" sz="1050" dirty="0"/>
-          </a:p>
-        </p:txBody>
-      </p:sp>
-      <p:sp>
-        <p:nvSpPr>
-          <p:cNvPr id="21" name="Rectangle 20"/>
-          <p:cNvSpPr/>
-          <p:nvPr/>
-        </p:nvSpPr>
-        <p:spPr>
-          <a:xfrm>
-            <a:off x="6796454" y="4495800"/>
-            <a:ext cx="929296" cy="346760"/>
-          </a:xfrm>
-          <a:prstGeom prst="rect">
-            <a:avLst/>
-          </a:prstGeom>
-          <a:ln w="19050"/>
-          <a:effectLst/>
-        </p:spPr>
-        <p:style>
-          <a:lnRef idx="1">
-            <a:schemeClr val="accent4"/>
-          </a:lnRef>
-          <a:fillRef idx="2">
-            <a:schemeClr val="accent4"/>
-          </a:fillRef>
-          <a:effectRef idx="1">
-            <a:schemeClr val="accent4"/>
-          </a:effectRef>
-          <a:fontRef idx="minor">
-            <a:schemeClr val="dk1"/>
-          </a:fontRef>
-        </p:style>
-        <p:txBody>
-          <a:bodyPr rtlCol="0" anchor="ctr"/>
-          <a:lstStyle/>
-          <a:p>
-            <a:pPr algn="ctr"/>
-            <a:r>
-              <a:rPr lang="en-US" sz="1050" dirty="0" smtClean="0"/>
-              <a:t>Email</a:t>
-            </a:r>
-            <a:endParaRPr lang="en-SG" sz="1050" dirty="0"/>
-          </a:p>
-        </p:txBody>
-      </p:sp>
-      <p:sp>
-        <p:nvSpPr>
-          <p:cNvPr id="22" name="Rectangle 21"/>
-          <p:cNvSpPr/>
-          <p:nvPr/>
-        </p:nvSpPr>
-        <p:spPr>
-          <a:xfrm>
-            <a:off x="6796454" y="4953000"/>
-            <a:ext cx="929296" cy="346760"/>
-          </a:xfrm>
-          <a:prstGeom prst="rect">
-            <a:avLst/>
-          </a:prstGeom>
-          <a:ln w="19050"/>
-          <a:effectLst/>
-        </p:spPr>
-        <p:style>
-          <a:lnRef idx="1">
-            <a:schemeClr val="accent4"/>
-          </a:lnRef>
-          <a:fillRef idx="2">
-            <a:schemeClr val="accent4"/>
-          </a:fillRef>
-          <a:effectRef idx="1">
-            <a:schemeClr val="accent4"/>
-          </a:effectRef>
-          <a:fontRef idx="minor">
-            <a:schemeClr val="dk1"/>
-          </a:fontRef>
-        </p:style>
-        <p:txBody>
-          <a:bodyPr rtlCol="0" anchor="ctr"/>
-          <a:lstStyle/>
-          <a:p>
-            <a:pPr algn="ctr"/>
-            <a:r>
-              <a:rPr lang="en-US" sz="1050" dirty="0" smtClean="0"/>
-              <a:t>Address</a:t>
-            </a:r>
-            <a:endParaRPr lang="en-SG" sz="1050" dirty="0"/>
-          </a:p>
-        </p:txBody>
-      </p:sp>
-      <p:sp>
-        <p:nvSpPr>
-          <p:cNvPr id="23" name="Rectangle 22"/>
-          <p:cNvSpPr/>
-          <p:nvPr/>
-        </p:nvSpPr>
-        <p:spPr>
-          <a:xfrm>
-            <a:off x="1153227" y="4460471"/>
-            <a:ext cx="929296" cy="346760"/>
-          </a:xfrm>
-          <a:prstGeom prst="rect">
-            <a:avLst/>
-          </a:prstGeom>
-          <a:ln w="19050"/>
-          <a:effectLst/>
-        </p:spPr>
-        <p:style>
-          <a:lnRef idx="1">
-            <a:schemeClr val="accent2"/>
-          </a:lnRef>
-          <a:fillRef idx="2">
-            <a:schemeClr val="accent2"/>
-          </a:fillRef>
-          <a:effectRef idx="1">
-            <a:schemeClr val="accent2"/>
-          </a:effectRef>
-          <a:fontRef idx="minor">
-            <a:schemeClr val="dk1"/>
-          </a:fontRef>
-        </p:style>
-        <p:txBody>
-          <a:bodyPr rtlCol="0" anchor="ctr"/>
-          <a:lstStyle/>
-          <a:p>
-            <a:pPr algn="ctr"/>
-            <a:r>
-              <a:rPr lang="en-US" sz="1050" dirty="0" err="1" smtClean="0"/>
-              <a:t>StorageFile</a:t>
-            </a:r>
-            <a:endParaRPr lang="en-SG" sz="1050" dirty="0"/>
-          </a:p>
-        </p:txBody>
-      </p:sp>
-      <p:cxnSp>
-        <p:nvCxnSpPr>
-          <p:cNvPr id="35" name="Elbow Connector 34"/>
-          <p:cNvCxnSpPr/>
-          <p:nvPr/>
-        </p:nvCxnSpPr>
-        <p:spPr>
-          <a:xfrm rot="5400000">
-            <a:off x="321738" y="4617731"/>
-            <a:ext cx="1047820" cy="1"/>
-          </a:xfrm>
-          <a:prstGeom prst="bentConnector3">
-            <a:avLst>
-              <a:gd name="adj1" fmla="val 50000"/>
-            </a:avLst>
-          </a:prstGeom>
-          <a:ln w="19050">
-            <a:solidFill>
-              <a:srgbClr val="C00000"/>
-            </a:solidFill>
-            <a:headEnd type="none" w="med" len="med"/>
-            <a:tailEnd type="arrow" w="med" len="med"/>
-          </a:ln>
-          <a:effectLst/>
-        </p:spPr>
-        <p:style>
-          <a:lnRef idx="1">
-            <a:schemeClr val="accent2"/>
-          </a:lnRef>
-          <a:fillRef idx="2">
-            <a:schemeClr val="accent2"/>
-          </a:fillRef>
-          <a:effectRef idx="1">
-            <a:schemeClr val="accent2"/>
-          </a:effectRef>
-          <a:fontRef idx="minor">
-            <a:schemeClr val="dk1"/>
-          </a:fontRef>
-        </p:style>
-      </p:cxnSp>
-      <p:cxnSp>
-        <p:nvCxnSpPr>
-          <p:cNvPr id="38" name="Elbow Connector 37"/>
-          <p:cNvCxnSpPr>
-            <a:stCxn id="12" idx="0"/>
-            <a:endCxn id="14" idx="1"/>
-          </p:cNvCxnSpPr>
-          <p:nvPr/>
-        </p:nvCxnSpPr>
-        <p:spPr>
-          <a:xfrm rot="5400000" flipH="1" flipV="1">
-            <a:off x="1053404" y="3352664"/>
-            <a:ext cx="567640" cy="221152"/>
-          </a:xfrm>
-          <a:prstGeom prst="bentConnector2">
-            <a:avLst/>
-          </a:prstGeom>
-          <a:ln w="19050">
-            <a:solidFill>
-              <a:srgbClr val="C00000"/>
-            </a:solidFill>
-            <a:prstDash val="dash"/>
-            <a:headEnd type="none" w="med" len="med"/>
-            <a:tailEnd type="arrow" w="med" len="med"/>
-          </a:ln>
-          <a:effectLst/>
-        </p:spPr>
-        <p:style>
-          <a:lnRef idx="1">
-            <a:schemeClr val="accent2"/>
-          </a:lnRef>
-          <a:fillRef idx="2">
-            <a:schemeClr val="accent2"/>
-          </a:fillRef>
-          <a:effectRef idx="1">
-            <a:schemeClr val="accent2"/>
-          </a:effectRef>
-          <a:fontRef idx="minor">
-            <a:schemeClr val="dk1"/>
-          </a:fontRef>
-        </p:style>
-      </p:cxnSp>
-      <p:cxnSp>
-        <p:nvCxnSpPr>
-          <p:cNvPr id="41" name="Elbow Connector 40"/>
-          <p:cNvCxnSpPr/>
-          <p:nvPr/>
-        </p:nvCxnSpPr>
-        <p:spPr>
-          <a:xfrm rot="16200000" flipH="1">
-            <a:off x="809847" y="4297627"/>
-            <a:ext cx="530702" cy="141745"/>
-          </a:xfrm>
-          <a:prstGeom prst="bentConnector2">
-            <a:avLst/>
-          </a:prstGeom>
-          <a:ln w="19050">
-            <a:solidFill>
-              <a:srgbClr val="C00000"/>
-            </a:solidFill>
-            <a:headEnd type="none" w="med" len="med"/>
-            <a:tailEnd type="arrow" w="med" len="med"/>
-          </a:ln>
-          <a:effectLst/>
-        </p:spPr>
-        <p:style>
-          <a:lnRef idx="1">
-            <a:schemeClr val="accent2"/>
-          </a:lnRef>
-          <a:fillRef idx="2">
-            <a:schemeClr val="accent2"/>
-          </a:fillRef>
-          <a:effectRef idx="1">
-            <a:schemeClr val="accent2"/>
-          </a:effectRef>
-          <a:fontRef idx="minor">
-            <a:schemeClr val="dk1"/>
-          </a:fontRef>
-        </p:style>
-      </p:cxnSp>
-      <p:cxnSp>
-        <p:nvCxnSpPr>
-          <p:cNvPr id="48" name="Elbow Connector 47"/>
-          <p:cNvCxnSpPr>
-            <a:stCxn id="106" idx="3"/>
-            <a:endCxn id="15" idx="1"/>
-          </p:cNvCxnSpPr>
-          <p:nvPr/>
-        </p:nvCxnSpPr>
-        <p:spPr>
-          <a:xfrm flipV="1">
-            <a:off x="3230192" y="3205940"/>
-            <a:ext cx="450854" cy="712546"/>
-          </a:xfrm>
-          <a:prstGeom prst="bentConnector3">
-            <a:avLst/>
-          </a:prstGeom>
-          <a:ln w="19050">
-            <a:headEnd type="none" w="med" len="med"/>
-            <a:tailEnd type="arrow" w="med" len="med"/>
-          </a:ln>
-          <a:effectLst/>
-        </p:spPr>
-        <p:style>
-          <a:lnRef idx="1">
-            <a:schemeClr val="accent6"/>
-          </a:lnRef>
-          <a:fillRef idx="2">
-            <a:schemeClr val="accent6"/>
-          </a:fillRef>
-          <a:effectRef idx="1">
-            <a:schemeClr val="accent6"/>
-          </a:effectRef>
-          <a:fontRef idx="minor">
-            <a:schemeClr val="dk1"/>
-          </a:fontRef>
-        </p:style>
-      </p:cxnSp>
-      <p:cxnSp>
-        <p:nvCxnSpPr>
-          <p:cNvPr id="51" name="Elbow Connector 50"/>
-          <p:cNvCxnSpPr>
-            <a:stCxn id="106" idx="3"/>
-            <a:endCxn id="16" idx="1"/>
-          </p:cNvCxnSpPr>
-          <p:nvPr/>
-        </p:nvCxnSpPr>
-        <p:spPr>
-          <a:xfrm>
-            <a:off x="3230192" y="3918486"/>
-            <a:ext cx="424477" cy="607579"/>
-          </a:xfrm>
-          <a:prstGeom prst="bentConnector3">
-            <a:avLst>
-              <a:gd name="adj1" fmla="val 52660"/>
-            </a:avLst>
-          </a:prstGeom>
-          <a:ln w="19050">
-            <a:headEnd type="none" w="med" len="med"/>
-            <a:tailEnd type="arrow" w="med" len="med"/>
-          </a:ln>
-          <a:effectLst/>
-        </p:spPr>
-        <p:style>
-          <a:lnRef idx="1">
-            <a:schemeClr val="accent6"/>
-          </a:lnRef>
-          <a:fillRef idx="2">
-            <a:schemeClr val="accent6"/>
-          </a:fillRef>
-          <a:effectRef idx="1">
-            <a:schemeClr val="accent6"/>
-          </a:effectRef>
-          <a:fontRef idx="minor">
-            <a:schemeClr val="dk1"/>
-          </a:fontRef>
-        </p:style>
-      </p:cxnSp>
-      <p:cxnSp>
-        <p:nvCxnSpPr>
-          <p:cNvPr id="62" name="Elbow Connector 61"/>
-          <p:cNvCxnSpPr>
-            <a:stCxn id="19" idx="0"/>
-            <a:endCxn id="79" idx="2"/>
-          </p:cNvCxnSpPr>
-          <p:nvPr/>
-        </p:nvCxnSpPr>
-        <p:spPr>
-          <a:xfrm rot="5400000" flipH="1" flipV="1">
-            <a:off x="5197424" y="3866003"/>
-            <a:ext cx="973365" cy="12700"/>
-          </a:xfrm>
-          <a:prstGeom prst="bentConnector3">
-            <a:avLst>
-              <a:gd name="adj1" fmla="val 50000"/>
-            </a:avLst>
-          </a:prstGeom>
-          <a:ln w="19050">
-            <a:headEnd type="none" w="med" len="med"/>
-            <a:tailEnd type="arrow" w="med" len="med"/>
-          </a:ln>
-          <a:effectLst/>
-        </p:spPr>
-        <p:style>
-          <a:lnRef idx="1">
-            <a:schemeClr val="accent6"/>
-          </a:lnRef>
-          <a:fillRef idx="2">
-            <a:schemeClr val="accent6"/>
-          </a:fillRef>
-          <a:effectRef idx="1">
-            <a:schemeClr val="accent6"/>
-          </a:effectRef>
-          <a:fontRef idx="minor">
-            <a:schemeClr val="dk1"/>
-          </a:fontRef>
-        </p:style>
-      </p:cxnSp>
-      <p:cxnSp>
-        <p:nvCxnSpPr>
-          <p:cNvPr id="65" name="Elbow Connector 64"/>
-          <p:cNvCxnSpPr>
-            <a:stCxn id="90" idx="3"/>
-            <a:endCxn id="20" idx="1"/>
-          </p:cNvCxnSpPr>
-          <p:nvPr/>
-        </p:nvCxnSpPr>
-        <p:spPr>
-          <a:xfrm flipV="1">
-            <a:off x="6384802" y="4209657"/>
-            <a:ext cx="396998" cy="312434"/>
-          </a:xfrm>
-          <a:prstGeom prst="bentConnector3">
-            <a:avLst>
-              <a:gd name="adj1" fmla="val 50000"/>
-            </a:avLst>
-          </a:prstGeom>
-          <a:ln w="19050">
-            <a:headEnd type="none" w="med" len="med"/>
-            <a:tailEnd type="arrow" w="med" len="med"/>
-          </a:ln>
-          <a:effectLst/>
-        </p:spPr>
-        <p:style>
-          <a:lnRef idx="1">
-            <a:schemeClr val="accent6"/>
-          </a:lnRef>
-          <a:fillRef idx="2">
-            <a:schemeClr val="accent6"/>
-          </a:fillRef>
-          <a:effectRef idx="1">
-            <a:schemeClr val="accent6"/>
-          </a:effectRef>
-          <a:fontRef idx="minor">
-            <a:schemeClr val="dk1"/>
-          </a:fontRef>
-        </p:style>
-      </p:cxnSp>
-      <p:cxnSp>
-        <p:nvCxnSpPr>
-          <p:cNvPr id="68" name="Elbow Connector 67"/>
-          <p:cNvCxnSpPr>
-            <a:stCxn id="90" idx="3"/>
-            <a:endCxn id="21" idx="1"/>
-          </p:cNvCxnSpPr>
-          <p:nvPr/>
-        </p:nvCxnSpPr>
-        <p:spPr>
-          <a:xfrm>
-            <a:off x="6384802" y="4522091"/>
-            <a:ext cx="411652" cy="147089"/>
-          </a:xfrm>
-          <a:prstGeom prst="bentConnector3">
-            <a:avLst>
-              <a:gd name="adj1" fmla="val 50000"/>
-            </a:avLst>
-          </a:prstGeom>
-          <a:ln w="19050">
-            <a:headEnd type="none" w="med" len="med"/>
-            <a:tailEnd type="arrow" w="med" len="med"/>
-          </a:ln>
-          <a:effectLst/>
-        </p:spPr>
-        <p:style>
-          <a:lnRef idx="1">
-            <a:schemeClr val="accent6"/>
-          </a:lnRef>
-          <a:fillRef idx="2">
-            <a:schemeClr val="accent6"/>
-          </a:fillRef>
-          <a:effectRef idx="1">
-            <a:schemeClr val="accent6"/>
-          </a:effectRef>
-          <a:fontRef idx="minor">
-            <a:schemeClr val="dk1"/>
-          </a:fontRef>
-        </p:style>
-      </p:cxnSp>
-      <p:cxnSp>
-        <p:nvCxnSpPr>
-          <p:cNvPr id="71" name="Elbow Connector 70"/>
-          <p:cNvCxnSpPr>
-            <a:stCxn id="90" idx="3"/>
-            <a:endCxn id="22" idx="1"/>
-          </p:cNvCxnSpPr>
-          <p:nvPr/>
-        </p:nvCxnSpPr>
-        <p:spPr>
-          <a:xfrm>
-            <a:off x="6384802" y="4522091"/>
-            <a:ext cx="411652" cy="604289"/>
-          </a:xfrm>
-          <a:prstGeom prst="bentConnector3">
-            <a:avLst>
-              <a:gd name="adj1" fmla="val 50000"/>
-            </a:avLst>
-          </a:prstGeom>
-          <a:ln w="19050">
-            <a:headEnd type="none" w="med" len="med"/>
-            <a:tailEnd type="arrow" w="med" len="med"/>
-          </a:ln>
-          <a:effectLst/>
-        </p:spPr>
-        <p:style>
-          <a:lnRef idx="1">
-            <a:schemeClr val="accent6"/>
-          </a:lnRef>
-          <a:fillRef idx="2">
-            <a:schemeClr val="accent6"/>
-          </a:fillRef>
-          <a:effectRef idx="1">
-            <a:schemeClr val="accent6"/>
-          </a:effectRef>
-          <a:fontRef idx="minor">
-            <a:schemeClr val="dk1"/>
-          </a:fontRef>
-        </p:style>
-      </p:cxnSp>
-      <p:sp>
-        <p:nvSpPr>
-          <p:cNvPr id="79" name="Rectangle 78"/>
-          <p:cNvSpPr/>
-          <p:nvPr/>
-        </p:nvSpPr>
-        <p:spPr>
-          <a:xfrm>
-            <a:off x="5219458" y="3032560"/>
-            <a:ext cx="929296" cy="346760"/>
-          </a:xfrm>
-          <a:prstGeom prst="rect">
-            <a:avLst/>
-          </a:prstGeom>
-          <a:ln w="19050"/>
-          <a:effectLst/>
-        </p:spPr>
-        <p:style>
-          <a:lnRef idx="1">
-            <a:schemeClr val="accent6"/>
-          </a:lnRef>
-          <a:fillRef idx="2">
-            <a:schemeClr val="accent6"/>
-          </a:fillRef>
-          <a:effectRef idx="1">
-            <a:schemeClr val="accent6"/>
-          </a:effectRef>
-          <a:fontRef idx="minor">
-            <a:schemeClr val="dk1"/>
-          </a:fontRef>
-        </p:style>
-        <p:txBody>
-          <a:bodyPr rtlCol="0" anchor="ctr"/>
-          <a:lstStyle/>
-          <a:p>
-            <a:pPr algn="ctr"/>
-            <a:r>
-              <a:rPr lang="en-US" sz="1050" dirty="0"/>
-              <a:t>Tag</a:t>
-            </a:r>
-            <a:endParaRPr lang="en-SG" sz="1050" dirty="0"/>
-          </a:p>
-        </p:txBody>
-      </p:sp>
-      <p:sp>
-        <p:nvSpPr>
-          <p:cNvPr id="90" name="Flowchart: Decision 89"/>
-          <p:cNvSpPr/>
-          <p:nvPr/>
-        </p:nvSpPr>
-        <p:spPr>
-          <a:xfrm>
-            <a:off x="6148754" y="4435401"/>
-            <a:ext cx="236048" cy="173380"/>
-          </a:xfrm>
-          <a:prstGeom prst="flowChartDecision">
-            <a:avLst/>
-          </a:prstGeom>
-          <a:solidFill>
-            <a:schemeClr val="accent6"/>
-          </a:solidFill>
-          <a:ln w="19050"/>
-          <a:effectLst/>
-        </p:spPr>
-        <p:style>
-          <a:lnRef idx="1">
-            <a:schemeClr val="accent6"/>
-          </a:lnRef>
-          <a:fillRef idx="2">
-            <a:schemeClr val="accent6"/>
-          </a:fillRef>
-          <a:effectRef idx="1">
-            <a:schemeClr val="accent6"/>
-          </a:effectRef>
-          <a:fontRef idx="minor">
-            <a:schemeClr val="dk1"/>
-          </a:fontRef>
-        </p:style>
-        <p:txBody>
-          <a:bodyPr rtlCol="0" anchor="ctr"/>
-          <a:lstStyle/>
-          <a:p>
-            <a:pPr algn="ctr"/>
-            <a:endParaRPr lang="en-US" sz="1050">
-              <a:solidFill>
-                <a:schemeClr val="dk1"/>
-              </a:solidFill>
-            </a:endParaRPr>
-          </a:p>
-        </p:txBody>
-      </p:sp>
-      <p:sp>
-        <p:nvSpPr>
-          <p:cNvPr id="97" name="Flowchart: Decision 96"/>
-          <p:cNvSpPr/>
-          <p:nvPr/>
-        </p:nvSpPr>
-        <p:spPr>
-          <a:xfrm>
-            <a:off x="4610342" y="3131950"/>
-            <a:ext cx="236048" cy="173380"/>
-          </a:xfrm>
-          <a:prstGeom prst="flowChartDecision">
-            <a:avLst/>
-          </a:prstGeom>
-          <a:noFill/>
-          <a:ln w="19050"/>
-          <a:effectLst/>
-        </p:spPr>
-        <p:style>
-          <a:lnRef idx="1">
-            <a:schemeClr val="accent6"/>
-          </a:lnRef>
-          <a:fillRef idx="2">
-            <a:schemeClr val="accent6"/>
-          </a:fillRef>
-          <a:effectRef idx="1">
-            <a:schemeClr val="accent6"/>
-          </a:effectRef>
-          <a:fontRef idx="minor">
-            <a:schemeClr val="dk1"/>
-          </a:fontRef>
-        </p:style>
-        <p:txBody>
-          <a:bodyPr rtlCol="0" anchor="ctr"/>
-          <a:lstStyle/>
-          <a:p>
-            <a:pPr algn="ctr"/>
-            <a:endParaRPr lang="en-US" sz="1050"/>
-          </a:p>
-        </p:txBody>
-      </p:sp>
-      <p:sp>
-        <p:nvSpPr>
-          <p:cNvPr id="100" name="Flowchart: Decision 99"/>
-          <p:cNvSpPr/>
-          <p:nvPr/>
-        </p:nvSpPr>
-        <p:spPr>
-          <a:xfrm>
-            <a:off x="4573941" y="4439375"/>
-            <a:ext cx="236048" cy="173380"/>
-          </a:xfrm>
-          <a:prstGeom prst="flowChartDecision">
-            <a:avLst/>
-          </a:prstGeom>
-          <a:noFill/>
-          <a:ln w="19050"/>
-          <a:effectLst/>
-        </p:spPr>
-        <p:style>
-          <a:lnRef idx="1">
-            <a:schemeClr val="accent6"/>
-          </a:lnRef>
-          <a:fillRef idx="2">
-            <a:schemeClr val="accent6"/>
-          </a:fillRef>
-          <a:effectRef idx="1">
-            <a:schemeClr val="accent6"/>
-          </a:effectRef>
-          <a:fontRef idx="minor">
-            <a:schemeClr val="dk1"/>
-          </a:fontRef>
-        </p:style>
-        <p:txBody>
-          <a:bodyPr rtlCol="0" anchor="ctr"/>
-          <a:lstStyle/>
-          <a:p>
-            <a:pPr algn="ctr"/>
-            <a:endParaRPr lang="en-US" sz="1050"/>
-          </a:p>
-        </p:txBody>
-      </p:sp>
-      <p:sp>
-        <p:nvSpPr>
-          <p:cNvPr id="106" name="Flowchart: Decision 105"/>
-          <p:cNvSpPr/>
-          <p:nvPr/>
-        </p:nvSpPr>
-        <p:spPr>
-          <a:xfrm>
-            <a:off x="2994144" y="3831796"/>
-            <a:ext cx="236048" cy="173380"/>
-          </a:xfrm>
-          <a:prstGeom prst="flowChartDecision">
-            <a:avLst/>
-          </a:prstGeom>
-          <a:solidFill>
-            <a:schemeClr val="accent6"/>
-          </a:solidFill>
-          <a:ln w="19050"/>
-          <a:effectLst/>
-        </p:spPr>
-        <p:style>
-          <a:lnRef idx="1">
-            <a:schemeClr val="accent6"/>
-          </a:lnRef>
-          <a:fillRef idx="2">
-            <a:schemeClr val="accent6"/>
-          </a:fillRef>
-          <a:effectRef idx="1">
-            <a:schemeClr val="accent6"/>
-          </a:effectRef>
-          <a:fontRef idx="minor">
-            <a:schemeClr val="dk1"/>
-          </a:fontRef>
-        </p:style>
-        <p:txBody>
-          <a:bodyPr rtlCol="0" anchor="ctr"/>
-          <a:lstStyle/>
-          <a:p>
-            <a:pPr algn="ctr"/>
-            <a:endParaRPr lang="en-US" sz="1050"/>
-          </a:p>
-        </p:txBody>
-      </p:sp>
-      <p:cxnSp>
-        <p:nvCxnSpPr>
-          <p:cNvPr id="114" name="Straight Arrow Connector 113"/>
-          <p:cNvCxnSpPr>
-            <a:stCxn id="97" idx="3"/>
-            <a:endCxn id="79" idx="1"/>
-          </p:cNvCxnSpPr>
-          <p:nvPr/>
-        </p:nvCxnSpPr>
-        <p:spPr>
-          <a:xfrm flipV="1">
-            <a:off x="4846390" y="3205940"/>
-            <a:ext cx="373068" cy="12700"/>
-          </a:xfrm>
-          <a:prstGeom prst="straightConnector1">
-            <a:avLst/>
-          </a:prstGeom>
-          <a:ln w="19050">
-            <a:headEnd type="none" w="med" len="med"/>
-            <a:tailEnd type="arrow" w="med" len="med"/>
-          </a:ln>
-          <a:effectLst/>
-        </p:spPr>
-        <p:style>
-          <a:lnRef idx="1">
-            <a:schemeClr val="accent6"/>
-          </a:lnRef>
-          <a:fillRef idx="2">
-            <a:schemeClr val="accent6"/>
-          </a:fillRef>
-          <a:effectRef idx="1">
-            <a:schemeClr val="accent6"/>
-          </a:effectRef>
-          <a:fontRef idx="minor">
-            <a:schemeClr val="dk1"/>
-          </a:fontRef>
-        </p:style>
-      </p:cxnSp>
-      <p:cxnSp>
-        <p:nvCxnSpPr>
-          <p:cNvPr id="115" name="Straight Arrow Connector 114"/>
-          <p:cNvCxnSpPr>
-            <a:stCxn id="100" idx="3"/>
-            <a:endCxn id="19" idx="1"/>
-          </p:cNvCxnSpPr>
-          <p:nvPr/>
-        </p:nvCxnSpPr>
-        <p:spPr>
-          <a:xfrm>
-            <a:off x="4809989" y="4526065"/>
-            <a:ext cx="409469" cy="0"/>
-          </a:xfrm>
-          <a:prstGeom prst="straightConnector1">
-            <a:avLst/>
-          </a:prstGeom>
-          <a:ln w="19050">
-            <a:headEnd type="none" w="med" len="med"/>
-            <a:tailEnd type="arrow" w="med" len="med"/>
-          </a:ln>
-          <a:effectLst/>
-        </p:spPr>
-        <p:style>
-          <a:lnRef idx="1">
-            <a:schemeClr val="accent6"/>
-          </a:lnRef>
-          <a:fillRef idx="2">
-            <a:schemeClr val="accent6"/>
-          </a:fillRef>
-          <a:effectRef idx="1">
-            <a:schemeClr val="accent6"/>
-          </a:effectRef>
-          <a:fontRef idx="minor">
-            <a:schemeClr val="dk1"/>
-          </a:fontRef>
-        </p:style>
-      </p:cxnSp>
-      <p:cxnSp>
-        <p:nvCxnSpPr>
-          <p:cNvPr id="118" name="Straight Arrow Connector 117"/>
-          <p:cNvCxnSpPr>
-            <a:stCxn id="12" idx="3"/>
-            <a:endCxn id="13" idx="1"/>
-          </p:cNvCxnSpPr>
-          <p:nvPr/>
-        </p:nvCxnSpPr>
-        <p:spPr>
-          <a:xfrm>
-            <a:off x="1691296" y="3920440"/>
-            <a:ext cx="373552" cy="0"/>
-          </a:xfrm>
-          <a:prstGeom prst="straightConnector1">
-            <a:avLst/>
-          </a:prstGeom>
-          <a:ln w="19050">
-            <a:solidFill>
-              <a:srgbClr val="C00000"/>
-            </a:solidFill>
-            <a:headEnd type="none" w="med" len="med"/>
-            <a:tailEnd type="arrow" w="med" len="med"/>
-          </a:ln>
-          <a:effectLst/>
-        </p:spPr>
-        <p:style>
-          <a:lnRef idx="1">
-            <a:schemeClr val="accent2"/>
-          </a:lnRef>
-          <a:fillRef idx="2">
-            <a:schemeClr val="accent2"/>
-          </a:fillRef>
-          <a:effectRef idx="1">
-            <a:schemeClr val="accent2"/>
-          </a:effectRef>
-          <a:fontRef idx="minor">
-            <a:schemeClr val="dk1"/>
-          </a:fontRef>
-        </p:style>
-      </p:cxnSp>
-      <p:sp>
-        <p:nvSpPr>
-          <p:cNvPr id="129" name="Rectangle 128"/>
-          <p:cNvSpPr/>
-          <p:nvPr/>
-        </p:nvSpPr>
-        <p:spPr>
-          <a:xfrm>
-            <a:off x="2258278" y="5140408"/>
-            <a:ext cx="1408598" cy="346760"/>
-          </a:xfrm>
-          <a:prstGeom prst="rect">
-            <a:avLst/>
-          </a:prstGeom>
-          <a:ln w="19050"/>
-          <a:effectLst/>
-        </p:spPr>
-        <p:style>
-          <a:lnRef idx="1">
-            <a:schemeClr val="accent6"/>
-          </a:lnRef>
-          <a:fillRef idx="2">
-            <a:schemeClr val="accent6"/>
-          </a:fillRef>
-          <a:effectRef idx="1">
-            <a:schemeClr val="accent6"/>
-          </a:effectRef>
-          <a:fontRef idx="minor">
-            <a:schemeClr val="dk1"/>
-          </a:fontRef>
-        </p:style>
-        <p:txBody>
-          <a:bodyPr rtlCol="0" anchor="ctr"/>
-          <a:lstStyle/>
-          <a:p>
-            <a:pPr algn="ctr"/>
-            <a:r>
-              <a:rPr lang="en-US" sz="1050" dirty="0" smtClean="0"/>
-              <a:t>&lt;&lt;interface&gt;&gt;</a:t>
-            </a:r>
-          </a:p>
-          <a:p>
-            <a:pPr algn="ctr"/>
-            <a:r>
-              <a:rPr lang="en-US" sz="1050" dirty="0" err="1" smtClean="0"/>
-              <a:t>ReadOnlyPerson</a:t>
-            </a:r>
-            <a:endParaRPr lang="en-SG" sz="1050" dirty="0"/>
-          </a:p>
-        </p:txBody>
-      </p:sp>
-      <p:cxnSp>
-        <p:nvCxnSpPr>
-          <p:cNvPr id="132" name="Elbow Connector 131"/>
-          <p:cNvCxnSpPr>
-            <a:stCxn id="9" idx="3"/>
-            <a:endCxn id="129" idx="1"/>
-          </p:cNvCxnSpPr>
-          <p:nvPr/>
-        </p:nvCxnSpPr>
-        <p:spPr>
-          <a:xfrm flipV="1">
-            <a:off x="1691295" y="5313788"/>
-            <a:ext cx="566983" cy="1232"/>
-          </a:xfrm>
-          <a:prstGeom prst="bentConnector3">
-            <a:avLst>
-              <a:gd name="adj1" fmla="val 50000"/>
-            </a:avLst>
-          </a:prstGeom>
-          <a:ln w="19050">
-            <a:solidFill>
-              <a:srgbClr val="C00000"/>
-            </a:solidFill>
-            <a:prstDash val="dash"/>
-            <a:headEnd type="none" w="med" len="med"/>
-            <a:tailEnd type="arrow" w="med" len="med"/>
-          </a:ln>
-          <a:effectLst/>
-        </p:spPr>
-        <p:style>
-          <a:lnRef idx="1">
-            <a:schemeClr val="accent2"/>
-          </a:lnRef>
-          <a:fillRef idx="2">
-            <a:schemeClr val="accent2"/>
-          </a:fillRef>
-          <a:effectRef idx="1">
-            <a:schemeClr val="accent2"/>
-          </a:effectRef>
-          <a:fontRef idx="minor">
-            <a:schemeClr val="dk1"/>
-          </a:fontRef>
-        </p:style>
-      </p:cxnSp>
-      <p:sp>
-        <p:nvSpPr>
-          <p:cNvPr id="135" name="Isosceles Triangle 134"/>
-          <p:cNvSpPr/>
-          <p:nvPr/>
-        </p:nvSpPr>
-        <p:spPr>
-          <a:xfrm rot="16200000">
-            <a:off x="3619386" y="5226026"/>
-            <a:ext cx="270504" cy="175523"/>
-          </a:xfrm>
-          <a:prstGeom prst="triangle">
-            <a:avLst/>
-          </a:prstGeom>
-          <a:ln w="19050"/>
-          <a:effectLst/>
-        </p:spPr>
-        <p:style>
-          <a:lnRef idx="1">
-            <a:schemeClr val="accent6"/>
-          </a:lnRef>
-          <a:fillRef idx="2">
-            <a:schemeClr val="accent6"/>
-          </a:fillRef>
-          <a:effectRef idx="1">
-            <a:schemeClr val="accent6"/>
-          </a:effectRef>
-          <a:fontRef idx="minor">
-            <a:schemeClr val="dk1"/>
-          </a:fontRef>
-        </p:style>
-        <p:txBody>
-          <a:bodyPr rtlCol="0" anchor="ctr"/>
-          <a:lstStyle/>
-          <a:p>
-            <a:pPr algn="ctr"/>
-            <a:endParaRPr lang="en-SG" sz="1050"/>
-          </a:p>
-        </p:txBody>
-      </p:sp>
-      <p:cxnSp>
-        <p:nvCxnSpPr>
-          <p:cNvPr id="136" name="Elbow Connector 135"/>
-          <p:cNvCxnSpPr>
-            <a:stCxn id="19" idx="2"/>
-            <a:endCxn id="135" idx="3"/>
-          </p:cNvCxnSpPr>
-          <p:nvPr/>
-        </p:nvCxnSpPr>
-        <p:spPr>
-          <a:xfrm rot="5400000">
-            <a:off x="4456082" y="4085763"/>
-            <a:ext cx="614343" cy="1841706"/>
-          </a:xfrm>
-          <a:prstGeom prst="bentConnector2">
-            <a:avLst/>
-          </a:prstGeom>
-          <a:ln w="19050">
-            <a:prstDash val="dash"/>
-            <a:headEnd type="none" w="med" len="med"/>
-            <a:tailEnd type="none" w="med" len="med"/>
-          </a:ln>
-          <a:effectLst/>
-        </p:spPr>
-        <p:style>
-          <a:lnRef idx="1">
-            <a:schemeClr val="accent6"/>
-          </a:lnRef>
-          <a:fillRef idx="2">
-            <a:schemeClr val="accent6"/>
-          </a:fillRef>
-          <a:effectRef idx="1">
-            <a:schemeClr val="accent6"/>
-          </a:effectRef>
-          <a:fontRef idx="minor">
-            <a:schemeClr val="dk1"/>
-          </a:fontRef>
-        </p:style>
-      </p:cxnSp>
-      <p:sp>
-        <p:nvSpPr>
-          <p:cNvPr id="46" name="Rectangle 45"/>
-          <p:cNvSpPr/>
-          <p:nvPr/>
-        </p:nvSpPr>
-        <p:spPr>
-          <a:xfrm>
-            <a:off x="2566828" y="1356188"/>
-            <a:ext cx="1611867" cy="444640"/>
-          </a:xfrm>
-          <a:prstGeom prst="rect">
-            <a:avLst/>
-          </a:prstGeom>
-          <a:ln w="19050"/>
-          <a:effectLst/>
-        </p:spPr>
-        <p:style>
-          <a:lnRef idx="1">
-            <a:schemeClr val="accent5"/>
-          </a:lnRef>
-          <a:fillRef idx="2">
-            <a:schemeClr val="accent5"/>
-          </a:fillRef>
-          <a:effectRef idx="1">
-            <a:schemeClr val="accent5"/>
-          </a:effectRef>
-          <a:fontRef idx="minor">
-            <a:schemeClr val="dk1"/>
-          </a:fontRef>
-        </p:style>
-        <p:txBody>
-          <a:bodyPr rtlCol="0" anchor="ctr"/>
-          <a:lstStyle/>
-          <a:p>
-            <a:pPr algn="ctr"/>
-            <a:r>
-              <a:rPr lang="en-US" sz="1050" dirty="0"/>
-              <a:t>{abstract}</a:t>
-            </a:r>
-            <a:br>
-              <a:rPr lang="en-US" sz="1050" dirty="0"/>
-            </a:br>
-            <a:r>
-              <a:rPr lang="en-US" sz="1050" dirty="0"/>
-              <a:t>Command</a:t>
-            </a:r>
-            <a:endParaRPr lang="en-SG" sz="1050" dirty="0"/>
-          </a:p>
-        </p:txBody>
-      </p:sp>
-      <p:sp>
-        <p:nvSpPr>
-          <p:cNvPr id="50" name="Rectangle 49"/>
-          <p:cNvSpPr/>
-          <p:nvPr/>
-        </p:nvSpPr>
-        <p:spPr>
-          <a:xfrm flipH="1">
-            <a:off x="4724400" y="1059080"/>
-            <a:ext cx="1404109" cy="346760"/>
-          </a:xfrm>
-          <a:prstGeom prst="rect">
-            <a:avLst/>
-          </a:prstGeom>
-          <a:ln w="19050"/>
-          <a:effectLst/>
-        </p:spPr>
-        <p:style>
-          <a:lnRef idx="1">
-            <a:schemeClr val="accent5"/>
-          </a:lnRef>
-          <a:fillRef idx="2">
-            <a:schemeClr val="accent5"/>
-          </a:fillRef>
-          <a:effectRef idx="1">
-            <a:schemeClr val="accent5"/>
-          </a:effectRef>
-          <a:fontRef idx="minor">
-            <a:schemeClr val="dk1"/>
-          </a:fontRef>
-        </p:style>
-        <p:txBody>
-          <a:bodyPr rtlCol="0" anchor="ctr"/>
-          <a:lstStyle/>
-          <a:p>
-            <a:pPr algn="ctr"/>
-            <a:r>
-              <a:rPr lang="en-US" sz="1050" dirty="0" err="1"/>
-              <a:t>AddCommand</a:t>
-            </a:r>
-            <a:endParaRPr lang="en-SG" sz="1050" dirty="0"/>
-          </a:p>
-        </p:txBody>
-      </p:sp>
-      <p:sp>
-        <p:nvSpPr>
-          <p:cNvPr id="52" name="Rectangle 51"/>
-          <p:cNvSpPr/>
-          <p:nvPr/>
-        </p:nvSpPr>
-        <p:spPr>
-          <a:xfrm flipH="1">
-            <a:off x="4724400" y="1454067"/>
-            <a:ext cx="1404109" cy="346760"/>
-          </a:xfrm>
-          <a:prstGeom prst="rect">
-            <a:avLst/>
-          </a:prstGeom>
-          <a:ln w="19050"/>
-          <a:effectLst/>
-        </p:spPr>
-        <p:style>
-          <a:lnRef idx="1">
-            <a:schemeClr val="accent5"/>
-          </a:lnRef>
-          <a:fillRef idx="2">
-            <a:schemeClr val="accent5"/>
-          </a:fillRef>
-          <a:effectRef idx="1">
-            <a:schemeClr val="accent5"/>
-          </a:effectRef>
-          <a:fontRef idx="minor">
-            <a:schemeClr val="dk1"/>
-          </a:fontRef>
-        </p:style>
-        <p:txBody>
-          <a:bodyPr rtlCol="0" anchor="ctr"/>
-          <a:lstStyle/>
-          <a:p>
-            <a:pPr algn="ctr"/>
-            <a:r>
-              <a:rPr lang="en-US" sz="1050" dirty="0" err="1"/>
-              <a:t>CrearCommand</a:t>
-            </a:r>
-            <a:endParaRPr lang="en-SG" sz="1050" dirty="0"/>
-          </a:p>
-        </p:txBody>
-      </p:sp>
-      <p:sp>
-        <p:nvSpPr>
-          <p:cNvPr id="53" name="Rectangle 52"/>
-          <p:cNvSpPr/>
-          <p:nvPr/>
-        </p:nvSpPr>
-        <p:spPr>
-          <a:xfrm flipH="1">
-            <a:off x="4724400" y="1849054"/>
-            <a:ext cx="1404109" cy="346760"/>
-          </a:xfrm>
-          <a:prstGeom prst="rect">
-            <a:avLst/>
-          </a:prstGeom>
-          <a:ln w="19050"/>
-          <a:effectLst/>
-        </p:spPr>
-        <p:style>
-          <a:lnRef idx="1">
-            <a:schemeClr val="accent5"/>
-          </a:lnRef>
-          <a:fillRef idx="2">
-            <a:schemeClr val="accent5"/>
-          </a:fillRef>
-          <a:effectRef idx="1">
-            <a:schemeClr val="accent5"/>
-          </a:effectRef>
-          <a:fontRef idx="minor">
-            <a:schemeClr val="dk1"/>
-          </a:fontRef>
-        </p:style>
-        <p:txBody>
-          <a:bodyPr rtlCol="0" anchor="ctr"/>
-          <a:lstStyle/>
-          <a:p>
-            <a:pPr algn="ctr"/>
-            <a:r>
-              <a:rPr lang="en-US" sz="1050" dirty="0" err="1"/>
-              <a:t>IncorrectCommand</a:t>
-            </a:r>
-            <a:endParaRPr lang="en-SG" sz="1050" dirty="0"/>
-          </a:p>
-        </p:txBody>
-      </p:sp>
-      <p:sp>
-        <p:nvSpPr>
-          <p:cNvPr id="54" name="Isosceles Triangle 53"/>
-          <p:cNvSpPr/>
-          <p:nvPr/>
-        </p:nvSpPr>
-        <p:spPr>
-          <a:xfrm rot="16200000">
-            <a:off x="4131203" y="1571491"/>
-            <a:ext cx="270504" cy="175523"/>
-          </a:xfrm>
-          <a:prstGeom prst="triangle">
-            <a:avLst/>
-          </a:prstGeom>
-          <a:ln w="19050"/>
-          <a:effectLst/>
-        </p:spPr>
-        <p:style>
-          <a:lnRef idx="1">
-            <a:schemeClr val="accent5"/>
-          </a:lnRef>
-          <a:fillRef idx="2">
-            <a:schemeClr val="accent5"/>
-          </a:fillRef>
-          <a:effectRef idx="1">
-            <a:schemeClr val="accent5"/>
-          </a:effectRef>
-          <a:fontRef idx="minor">
-            <a:schemeClr val="dk1"/>
-          </a:fontRef>
-        </p:style>
-        <p:txBody>
-          <a:bodyPr rtlCol="0" anchor="ctr"/>
-          <a:lstStyle/>
-          <a:p>
-            <a:pPr algn="ctr"/>
-            <a:endParaRPr lang="en-SG" sz="1050"/>
-          </a:p>
-        </p:txBody>
-      </p:sp>
-      <p:cxnSp>
-        <p:nvCxnSpPr>
-          <p:cNvPr id="55" name="Elbow Connector 54"/>
-          <p:cNvCxnSpPr>
-            <a:stCxn id="54" idx="3"/>
-            <a:endCxn id="52" idx="3"/>
-          </p:cNvCxnSpPr>
-          <p:nvPr/>
-        </p:nvCxnSpPr>
-        <p:spPr>
-          <a:xfrm flipV="1">
-            <a:off x="4354217" y="1627447"/>
-            <a:ext cx="370183" cy="31806"/>
-          </a:xfrm>
-          <a:prstGeom prst="bentConnector3">
-            <a:avLst>
-              <a:gd name="adj1" fmla="val 50000"/>
-            </a:avLst>
-          </a:prstGeom>
-          <a:noFill/>
-          <a:ln w="19050"/>
-          <a:effectLst/>
-        </p:spPr>
-        <p:style>
-          <a:lnRef idx="1">
-            <a:schemeClr val="accent5"/>
-          </a:lnRef>
-          <a:fillRef idx="2">
-            <a:schemeClr val="accent5"/>
-          </a:fillRef>
-          <a:effectRef idx="1">
-            <a:schemeClr val="accent5"/>
-          </a:effectRef>
-          <a:fontRef idx="minor">
-            <a:schemeClr val="dk1"/>
-          </a:fontRef>
-        </p:style>
-      </p:cxnSp>
-      <p:cxnSp>
-        <p:nvCxnSpPr>
-          <p:cNvPr id="56" name="Elbow Connector 55"/>
-          <p:cNvCxnSpPr>
-            <a:stCxn id="54" idx="3"/>
-            <a:endCxn id="50" idx="3"/>
-          </p:cNvCxnSpPr>
-          <p:nvPr/>
-        </p:nvCxnSpPr>
-        <p:spPr>
-          <a:xfrm flipV="1">
-            <a:off x="4354217" y="1232460"/>
-            <a:ext cx="370183" cy="426793"/>
-          </a:xfrm>
-          <a:prstGeom prst="bentConnector3">
-            <a:avLst>
-              <a:gd name="adj1" fmla="val 50000"/>
-            </a:avLst>
-          </a:prstGeom>
-          <a:noFill/>
-          <a:ln w="19050"/>
-          <a:effectLst/>
-        </p:spPr>
-        <p:style>
-          <a:lnRef idx="1">
-            <a:schemeClr val="accent5"/>
-          </a:lnRef>
-          <a:fillRef idx="2">
-            <a:schemeClr val="accent5"/>
-          </a:fillRef>
-          <a:effectRef idx="1">
-            <a:schemeClr val="accent5"/>
-          </a:effectRef>
-          <a:fontRef idx="minor">
-            <a:schemeClr val="dk1"/>
-          </a:fontRef>
-        </p:style>
-      </p:cxnSp>
-      <p:cxnSp>
-        <p:nvCxnSpPr>
-          <p:cNvPr id="57" name="Elbow Connector 56"/>
-          <p:cNvCxnSpPr>
-            <a:stCxn id="54" idx="3"/>
-            <a:endCxn id="53" idx="3"/>
-          </p:cNvCxnSpPr>
-          <p:nvPr/>
-        </p:nvCxnSpPr>
-        <p:spPr>
-          <a:xfrm>
-            <a:off x="4354217" y="1659253"/>
-            <a:ext cx="370183" cy="363181"/>
-          </a:xfrm>
-          <a:prstGeom prst="bentConnector3">
-            <a:avLst>
-              <a:gd name="adj1" fmla="val 50000"/>
-            </a:avLst>
-          </a:prstGeom>
-          <a:noFill/>
-          <a:ln w="19050"/>
-          <a:effectLst/>
-        </p:spPr>
-        <p:style>
-          <a:lnRef idx="1">
-            <a:schemeClr val="accent5"/>
-          </a:lnRef>
-          <a:fillRef idx="2">
-            <a:schemeClr val="accent5"/>
-          </a:fillRef>
-          <a:effectRef idx="1">
-            <a:schemeClr val="accent5"/>
-          </a:effectRef>
-          <a:fontRef idx="minor">
-            <a:schemeClr val="dk1"/>
-          </a:fontRef>
-        </p:style>
-      </p:cxnSp>
-      <p:sp>
-        <p:nvSpPr>
-          <p:cNvPr id="59" name="Rectangle 58"/>
-          <p:cNvSpPr/>
-          <p:nvPr/>
-        </p:nvSpPr>
-        <p:spPr>
-          <a:xfrm flipH="1">
-            <a:off x="4724400" y="2244040"/>
-            <a:ext cx="1404109" cy="346760"/>
-          </a:xfrm>
-          <a:prstGeom prst="rect">
-            <a:avLst/>
-          </a:prstGeom>
-          <a:ln w="19050"/>
-          <a:effectLst/>
-        </p:spPr>
-        <p:style>
-          <a:lnRef idx="1">
-            <a:schemeClr val="accent5"/>
-          </a:lnRef>
-          <a:fillRef idx="2">
-            <a:schemeClr val="accent5"/>
-          </a:fillRef>
-          <a:effectRef idx="1">
-            <a:schemeClr val="accent5"/>
-          </a:effectRef>
-          <a:fontRef idx="minor">
-            <a:schemeClr val="dk1"/>
-          </a:fontRef>
-        </p:style>
-        <p:txBody>
-          <a:bodyPr rtlCol="0" anchor="ctr"/>
-          <a:lstStyle/>
-          <a:p>
-            <a:pPr algn="ctr"/>
-            <a:r>
-              <a:rPr lang="en-US" sz="1050" dirty="0" smtClean="0"/>
-              <a:t>…Command</a:t>
-            </a:r>
-            <a:endParaRPr lang="en-SG" sz="1050" dirty="0"/>
-          </a:p>
-        </p:txBody>
-      </p:sp>
-      <p:cxnSp>
-        <p:nvCxnSpPr>
-          <p:cNvPr id="60" name="Elbow Connector 59"/>
-          <p:cNvCxnSpPr>
-            <a:stCxn id="54" idx="3"/>
-            <a:endCxn id="59" idx="3"/>
-          </p:cNvCxnSpPr>
-          <p:nvPr/>
-        </p:nvCxnSpPr>
-        <p:spPr>
-          <a:xfrm>
-            <a:off x="4354217" y="1659253"/>
-            <a:ext cx="370183" cy="758167"/>
-          </a:xfrm>
-          <a:prstGeom prst="bentConnector3">
-            <a:avLst>
-              <a:gd name="adj1" fmla="val 50000"/>
-            </a:avLst>
-          </a:prstGeom>
-          <a:noFill/>
-          <a:ln w="19050"/>
-          <a:effectLst/>
-        </p:spPr>
-        <p:style>
-          <a:lnRef idx="1">
-            <a:schemeClr val="accent5"/>
-          </a:lnRef>
-          <a:fillRef idx="2">
-            <a:schemeClr val="accent5"/>
-          </a:fillRef>
-          <a:effectRef idx="1">
-            <a:schemeClr val="accent5"/>
-          </a:effectRef>
-          <a:fontRef idx="minor">
-            <a:schemeClr val="dk1"/>
-          </a:fontRef>
-        </p:style>
-      </p:cxnSp>
-      <p:cxnSp>
-        <p:nvCxnSpPr>
-          <p:cNvPr id="67" name="Elbow Connector 66"/>
-          <p:cNvCxnSpPr>
-            <a:stCxn id="14" idx="0"/>
-            <a:endCxn id="46" idx="1"/>
-          </p:cNvCxnSpPr>
-          <p:nvPr/>
-        </p:nvCxnSpPr>
-        <p:spPr>
-          <a:xfrm rot="5400000" flipH="1" flipV="1">
-            <a:off x="1452229" y="1891441"/>
-            <a:ext cx="1427532" cy="801666"/>
-          </a:xfrm>
-          <a:prstGeom prst="bentConnector2">
-            <a:avLst/>
-          </a:prstGeom>
-          <a:ln w="19050">
-            <a:prstDash val="dash"/>
-            <a:headEnd type="none" w="med" len="med"/>
-            <a:tailEnd type="arrow" w="med" len="med"/>
-          </a:ln>
-          <a:effectLst/>
-        </p:spPr>
-        <p:style>
-          <a:lnRef idx="1">
-            <a:schemeClr val="accent2"/>
-          </a:lnRef>
-          <a:fillRef idx="2">
-            <a:schemeClr val="accent2"/>
-          </a:fillRef>
-          <a:effectRef idx="1">
-            <a:schemeClr val="accent2"/>
-          </a:effectRef>
-          <a:fontRef idx="minor">
-            <a:schemeClr val="dk1"/>
-          </a:fontRef>
-        </p:style>
-      </p:cxnSp>
-      <p:cxnSp>
-        <p:nvCxnSpPr>
-          <p:cNvPr id="70" name="Elbow Connector 69"/>
-          <p:cNvCxnSpPr/>
-          <p:nvPr/>
-        </p:nvCxnSpPr>
-        <p:spPr>
-          <a:xfrm rot="5400000" flipH="1" flipV="1">
-            <a:off x="632132" y="1812364"/>
-            <a:ext cx="2293164" cy="1576229"/>
-          </a:xfrm>
-          <a:prstGeom prst="bentConnector3">
-            <a:avLst>
-              <a:gd name="adj1" fmla="val 100051"/>
-            </a:avLst>
-          </a:prstGeom>
-          <a:ln w="19050">
-            <a:solidFill>
-              <a:srgbClr val="C00000"/>
-            </a:solidFill>
-            <a:prstDash val="dash"/>
-            <a:headEnd type="none" w="med" len="med"/>
-            <a:tailEnd type="arrow" w="med" len="med"/>
-          </a:ln>
-          <a:effectLst/>
-        </p:spPr>
-        <p:style>
-          <a:lnRef idx="1">
-            <a:schemeClr val="accent2"/>
-          </a:lnRef>
-          <a:fillRef idx="2">
-            <a:schemeClr val="accent2"/>
-          </a:fillRef>
-          <a:effectRef idx="1">
-            <a:schemeClr val="accent2"/>
-          </a:effectRef>
-          <a:fontRef idx="minor">
-            <a:schemeClr val="dk1"/>
-          </a:fontRef>
-        </p:style>
-      </p:cxnSp>
-      <p:cxnSp>
-        <p:nvCxnSpPr>
-          <p:cNvPr id="73" name="Elbow Connector 72"/>
-          <p:cNvCxnSpPr/>
-          <p:nvPr/>
-        </p:nvCxnSpPr>
-        <p:spPr>
-          <a:xfrm rot="5400000">
-            <a:off x="1795164" y="2790743"/>
-            <a:ext cx="1889726" cy="6348"/>
-          </a:xfrm>
-          <a:prstGeom prst="bentConnector3">
-            <a:avLst>
-              <a:gd name="adj1" fmla="val 50000"/>
-            </a:avLst>
-          </a:prstGeom>
-          <a:ln w="19050">
-            <a:solidFill>
-              <a:schemeClr val="accent5"/>
-            </a:solidFill>
-            <a:prstDash val="dash"/>
-            <a:headEnd type="none" w="med" len="med"/>
-            <a:tailEnd type="arrow" w="med" len="med"/>
-          </a:ln>
-          <a:effectLst/>
-        </p:spPr>
-        <p:style>
-          <a:lnRef idx="1">
-            <a:schemeClr val="accent2"/>
-          </a:lnRef>
-          <a:fillRef idx="2">
-            <a:schemeClr val="accent2"/>
-          </a:fillRef>
-          <a:effectRef idx="1">
-            <a:schemeClr val="accent2"/>
-          </a:effectRef>
-          <a:fontRef idx="minor">
-            <a:schemeClr val="dk1"/>
-          </a:fontRef>
-        </p:style>
-      </p:cxnSp>
-      <p:sp>
-        <p:nvSpPr>
-          <p:cNvPr id="81" name="Rectangle 80"/>
-          <p:cNvSpPr/>
-          <p:nvPr/>
-        </p:nvSpPr>
-        <p:spPr>
-          <a:xfrm flipH="1">
-            <a:off x="1219200" y="720040"/>
-            <a:ext cx="1404109" cy="346760"/>
-          </a:xfrm>
-          <a:prstGeom prst="rect">
-            <a:avLst/>
-          </a:prstGeom>
-          <a:ln w="19050"/>
-          <a:effectLst/>
-        </p:spPr>
-        <p:style>
-          <a:lnRef idx="1">
-            <a:schemeClr val="accent5"/>
-          </a:lnRef>
-          <a:fillRef idx="2">
-            <a:schemeClr val="accent5"/>
-          </a:fillRef>
-          <a:effectRef idx="1">
-            <a:schemeClr val="accent5"/>
-          </a:effectRef>
-          <a:fontRef idx="minor">
-            <a:schemeClr val="dk1"/>
-          </a:fontRef>
-        </p:style>
-        <p:txBody>
-          <a:bodyPr rtlCol="0" anchor="ctr"/>
-          <a:lstStyle/>
-          <a:p>
-            <a:pPr algn="ctr"/>
-            <a:r>
-              <a:rPr lang="en-US" sz="1050" dirty="0" err="1"/>
-              <a:t>CommandResult</a:t>
-            </a:r>
-            <a:endParaRPr lang="en-SG" sz="1050" dirty="0"/>
-          </a:p>
-        </p:txBody>
-      </p:sp>
-      <p:cxnSp>
-        <p:nvCxnSpPr>
-          <p:cNvPr id="82" name="Elbow Connector 81"/>
-          <p:cNvCxnSpPr>
-            <a:stCxn id="46" idx="0"/>
-            <a:endCxn id="81" idx="1"/>
-          </p:cNvCxnSpPr>
-          <p:nvPr/>
-        </p:nvCxnSpPr>
-        <p:spPr>
-          <a:xfrm rot="16200000" flipV="1">
-            <a:off x="2766652" y="750077"/>
-            <a:ext cx="462768" cy="749453"/>
-          </a:xfrm>
-          <a:prstGeom prst="bentConnector2">
-            <a:avLst/>
-          </a:prstGeom>
-          <a:ln w="19050">
-            <a:solidFill>
-              <a:schemeClr val="accent5"/>
-            </a:solidFill>
-            <a:prstDash val="dash"/>
-            <a:headEnd type="none" w="med" len="med"/>
-            <a:tailEnd type="arrow" w="med" len="med"/>
-          </a:ln>
-          <a:effectLst/>
-        </p:spPr>
-        <p:style>
-          <a:lnRef idx="1">
-            <a:schemeClr val="accent2"/>
-          </a:lnRef>
-          <a:fillRef idx="2">
-            <a:schemeClr val="accent2"/>
-          </a:fillRef>
-          <a:effectRef idx="1">
-            <a:schemeClr val="accent2"/>
-          </a:effectRef>
-          <a:fontRef idx="minor">
-            <a:schemeClr val="dk1"/>
-          </a:fontRef>
-        </p:style>
-      </p:cxnSp>
-      <p:cxnSp>
-        <p:nvCxnSpPr>
-          <p:cNvPr id="84" name="Elbow Connector 83"/>
-          <p:cNvCxnSpPr>
-            <a:endCxn id="81" idx="3"/>
-          </p:cNvCxnSpPr>
-          <p:nvPr/>
-        </p:nvCxnSpPr>
-        <p:spPr>
-          <a:xfrm rot="5400000" flipH="1" flipV="1">
-            <a:off x="-394396" y="2133468"/>
-            <a:ext cx="2853643" cy="373549"/>
-          </a:xfrm>
-          <a:prstGeom prst="bentConnector2">
-            <a:avLst/>
-          </a:prstGeom>
-          <a:ln w="19050">
-            <a:solidFill>
-              <a:srgbClr val="C00000"/>
-            </a:solidFill>
-            <a:prstDash val="dash"/>
-            <a:headEnd type="none" w="med" len="med"/>
-            <a:tailEnd type="arrow" w="med" len="med"/>
-          </a:ln>
-          <a:effectLst/>
-        </p:spPr>
-        <p:style>
-          <a:lnRef idx="1">
-            <a:schemeClr val="accent2"/>
-          </a:lnRef>
-          <a:fillRef idx="2">
-            <a:schemeClr val="accent2"/>
-          </a:fillRef>
-          <a:effectRef idx="1">
-            <a:schemeClr val="accent2"/>
-          </a:effectRef>
-          <a:fontRef idx="minor">
-            <a:schemeClr val="dk1"/>
-          </a:fontRef>
-        </p:style>
-      </p:cxnSp>
-      <p:sp>
-        <p:nvSpPr>
-          <p:cNvPr id="92" name="Rectangle 91"/>
-          <p:cNvSpPr/>
-          <p:nvPr/>
-        </p:nvSpPr>
-        <p:spPr>
-          <a:xfrm>
-            <a:off x="6781800" y="3539440"/>
-            <a:ext cx="929296" cy="346760"/>
-          </a:xfrm>
-          <a:prstGeom prst="rect">
-            <a:avLst/>
-          </a:prstGeom>
-          <a:ln w="19050"/>
-          <a:effectLst/>
-        </p:spPr>
-        <p:style>
-          <a:lnRef idx="1">
-            <a:schemeClr val="accent4"/>
-          </a:lnRef>
-          <a:fillRef idx="2">
-            <a:schemeClr val="accent4"/>
-          </a:fillRef>
-          <a:effectRef idx="1">
-            <a:schemeClr val="accent4"/>
-          </a:effectRef>
-          <a:fontRef idx="minor">
-            <a:schemeClr val="dk1"/>
-          </a:fontRef>
-        </p:style>
-        <p:txBody>
-          <a:bodyPr rtlCol="0" anchor="ctr"/>
-          <a:lstStyle/>
-          <a:p>
-            <a:pPr algn="ctr"/>
-            <a:r>
-              <a:rPr lang="en-US" sz="1050" dirty="0"/>
-              <a:t>Name</a:t>
-            </a:r>
-            <a:endParaRPr lang="en-SG" sz="1050" dirty="0"/>
-          </a:p>
-        </p:txBody>
-      </p:sp>
-      <p:cxnSp>
-        <p:nvCxnSpPr>
-          <p:cNvPr id="93" name="Elbow Connector 92"/>
-          <p:cNvCxnSpPr>
-            <a:stCxn id="90" idx="3"/>
-            <a:endCxn id="92" idx="1"/>
-          </p:cNvCxnSpPr>
-          <p:nvPr/>
-        </p:nvCxnSpPr>
-        <p:spPr>
-          <a:xfrm flipV="1">
-            <a:off x="6384802" y="3712820"/>
-            <a:ext cx="396998" cy="809271"/>
-          </a:xfrm>
-          <a:prstGeom prst="bentConnector3">
-            <a:avLst>
-              <a:gd name="adj1" fmla="val 50000"/>
-            </a:avLst>
-          </a:prstGeom>
-          <a:ln w="19050">
-            <a:headEnd type="none" w="med" len="med"/>
-            <a:tailEnd type="arrow" w="med" len="med"/>
-          </a:ln>
-          <a:effectLst/>
-        </p:spPr>
-        <p:style>
-          <a:lnRef idx="1">
-            <a:schemeClr val="accent6"/>
-          </a:lnRef>
-          <a:fillRef idx="2">
-            <a:schemeClr val="accent6"/>
-          </a:fillRef>
-          <a:effectRef idx="1">
-            <a:schemeClr val="accent6"/>
-          </a:effectRef>
-          <a:fontRef idx="minor">
-            <a:schemeClr val="dk1"/>
-          </a:fontRef>
-        </p:style>
-      </p:cxnSp>
-      <p:sp>
-        <p:nvSpPr>
-          <p:cNvPr id="96" name="Rectangle 95"/>
-          <p:cNvSpPr/>
-          <p:nvPr/>
-        </p:nvSpPr>
-        <p:spPr>
-          <a:xfrm>
-            <a:off x="6384802" y="874142"/>
-            <a:ext cx="929296" cy="346760"/>
-          </a:xfrm>
-          <a:prstGeom prst="rect">
-            <a:avLst/>
-          </a:prstGeom>
-          <a:ln w="19050"/>
-          <a:effectLst/>
-        </p:spPr>
-        <p:style>
-          <a:lnRef idx="1">
-            <a:schemeClr val="accent3"/>
-          </a:lnRef>
-          <a:fillRef idx="2">
-            <a:schemeClr val="accent3"/>
-          </a:fillRef>
-          <a:effectRef idx="1">
-            <a:schemeClr val="accent3"/>
-          </a:effectRef>
-          <a:fontRef idx="minor">
-            <a:schemeClr val="dk1"/>
-          </a:fontRef>
-        </p:style>
-        <p:txBody>
-          <a:bodyPr rtlCol="0" anchor="ctr"/>
-          <a:lstStyle/>
-          <a:p>
-            <a:pPr algn="ctr"/>
-            <a:r>
-              <a:rPr lang="en-US" sz="1050" dirty="0" smtClean="0"/>
-              <a:t>Messages</a:t>
-            </a:r>
-            <a:endParaRPr lang="en-SG" sz="1050" dirty="0"/>
-          </a:p>
-        </p:txBody>
-      </p:sp>
-      <p:sp>
-        <p:nvSpPr>
-          <p:cNvPr id="98" name="Rectangle 97"/>
-          <p:cNvSpPr/>
-          <p:nvPr/>
-        </p:nvSpPr>
-        <p:spPr>
-          <a:xfrm>
-            <a:off x="7592520" y="874142"/>
-            <a:ext cx="929296" cy="346760"/>
-          </a:xfrm>
-          <a:prstGeom prst="rect">
-            <a:avLst/>
-          </a:prstGeom>
-          <a:ln w="19050"/>
-          <a:effectLst/>
-        </p:spPr>
-        <p:style>
-          <a:lnRef idx="1">
-            <a:schemeClr val="accent3"/>
-          </a:lnRef>
-          <a:fillRef idx="2">
-            <a:schemeClr val="accent3"/>
-          </a:fillRef>
-          <a:effectRef idx="1">
-            <a:schemeClr val="accent3"/>
-          </a:effectRef>
-          <a:fontRef idx="minor">
-            <a:schemeClr val="dk1"/>
-          </a:fontRef>
-        </p:style>
-        <p:txBody>
-          <a:bodyPr rtlCol="0" anchor="ctr"/>
-          <a:lstStyle/>
-          <a:p>
-            <a:pPr algn="ctr"/>
-            <a:r>
-              <a:rPr lang="en-US" sz="1050" dirty="0" err="1" smtClean="0"/>
-              <a:t>Utils</a:t>
-            </a:r>
-            <a:endParaRPr lang="en-SG" sz="1050" dirty="0"/>
-          </a:p>
-        </p:txBody>
-      </p:sp>
-      <p:sp>
-        <p:nvSpPr>
-          <p:cNvPr id="99" name="Rectangle 98"/>
-          <p:cNvSpPr/>
-          <p:nvPr/>
-        </p:nvSpPr>
-        <p:spPr>
-          <a:xfrm>
-            <a:off x="3666876" y="3710497"/>
-            <a:ext cx="929296" cy="346760"/>
-          </a:xfrm>
-          <a:prstGeom prst="rect">
-            <a:avLst/>
-          </a:prstGeom>
-          <a:ln w="19050"/>
-          <a:effectLst/>
-        </p:spPr>
-        <p:style>
-          <a:lnRef idx="1">
-            <a:schemeClr val="accent6"/>
-          </a:lnRef>
-          <a:fillRef idx="2">
-            <a:schemeClr val="accent6"/>
-          </a:fillRef>
-          <a:effectRef idx="1">
-            <a:schemeClr val="accent6"/>
-          </a:effectRef>
-          <a:fontRef idx="minor">
-            <a:schemeClr val="dk1"/>
-          </a:fontRef>
-        </p:style>
-        <p:txBody>
-          <a:bodyPr rtlCol="0" anchor="ctr"/>
-          <a:lstStyle/>
-          <a:p>
-            <a:pPr algn="ctr"/>
-            <a:r>
-              <a:rPr lang="en-US" sz="1050" dirty="0"/>
-              <a:t>…Exception</a:t>
-            </a:r>
-            <a:endParaRPr lang="en-SG" sz="1050" dirty="0"/>
-          </a:p>
-        </p:txBody>
-      </p:sp>
-      <p:sp>
-        <p:nvSpPr>
-          <p:cNvPr id="101" name="Rectangle 100"/>
-          <p:cNvSpPr/>
-          <p:nvPr/>
-        </p:nvSpPr>
-        <p:spPr>
-          <a:xfrm>
-            <a:off x="2356763" y="4455640"/>
-            <a:ext cx="929296" cy="346760"/>
-          </a:xfrm>
-          <a:prstGeom prst="rect">
-            <a:avLst/>
-          </a:prstGeom>
-          <a:ln w="19050"/>
-          <a:effectLst/>
-        </p:spPr>
-        <p:style>
-          <a:lnRef idx="1">
-            <a:schemeClr val="accent2"/>
-          </a:lnRef>
-          <a:fillRef idx="2">
-            <a:schemeClr val="accent2"/>
-          </a:fillRef>
-          <a:effectRef idx="1">
-            <a:schemeClr val="accent2"/>
-          </a:effectRef>
-          <a:fontRef idx="minor">
-            <a:schemeClr val="dk1"/>
-          </a:fontRef>
-        </p:style>
-        <p:txBody>
-          <a:bodyPr rtlCol="0" anchor="ctr"/>
-          <a:lstStyle/>
-          <a:p>
-            <a:pPr algn="ctr"/>
-            <a:r>
-              <a:rPr lang="en-US" sz="1050" dirty="0" smtClean="0"/>
-              <a:t>Adapted…</a:t>
-            </a:r>
-            <a:endParaRPr lang="en-SG" sz="1050" dirty="0"/>
-          </a:p>
-        </p:txBody>
-      </p:sp>
-      <p:cxnSp>
-        <p:nvCxnSpPr>
-          <p:cNvPr id="102" name="Elbow Connector 101"/>
-          <p:cNvCxnSpPr>
-            <a:stCxn id="23" idx="3"/>
-            <a:endCxn id="101" idx="1"/>
-          </p:cNvCxnSpPr>
-          <p:nvPr/>
-        </p:nvCxnSpPr>
-        <p:spPr>
-          <a:xfrm flipV="1">
-            <a:off x="2082523" y="4629020"/>
-            <a:ext cx="274240" cy="4831"/>
-          </a:xfrm>
-          <a:prstGeom prst="bentConnector3">
-            <a:avLst>
-              <a:gd name="adj1" fmla="val 50000"/>
-            </a:avLst>
-          </a:prstGeom>
-          <a:ln w="19050">
-            <a:solidFill>
-              <a:srgbClr val="C00000"/>
-            </a:solidFill>
-            <a:prstDash val="dash"/>
-            <a:headEnd type="none" w="med" len="med"/>
-            <a:tailEnd type="arrow" w="med" len="med"/>
-          </a:ln>
-          <a:effectLst/>
-        </p:spPr>
-        <p:style>
-          <a:lnRef idx="1">
-            <a:schemeClr val="accent2"/>
-          </a:lnRef>
-          <a:fillRef idx="2">
-            <a:schemeClr val="accent2"/>
-          </a:fillRef>
-          <a:effectRef idx="1">
-            <a:schemeClr val="accent2"/>
-          </a:effectRef>
-          <a:fontRef idx="minor">
-            <a:schemeClr val="dk1"/>
-          </a:fontRef>
-        </p:style>
-      </p:cxnSp>
-      <p:cxnSp>
-        <p:nvCxnSpPr>
-          <p:cNvPr id="87" name="Straight Arrow Connector 86"/>
-          <p:cNvCxnSpPr/>
-          <p:nvPr/>
-        </p:nvCxnSpPr>
-        <p:spPr>
-          <a:xfrm flipV="1">
-            <a:off x="6689603" y="1199445"/>
-            <a:ext cx="0" cy="304800"/>
-          </a:xfrm>
-          <a:prstGeom prst="straightConnector1">
-            <a:avLst/>
-          </a:prstGeom>
-          <a:ln w="19050">
-            <a:solidFill>
-              <a:schemeClr val="accent3"/>
-            </a:solidFill>
-            <a:prstDash val="dash"/>
-            <a:headEnd type="none" w="med" len="med"/>
-            <a:tailEnd type="arrow" w="med" len="med"/>
-          </a:ln>
-          <a:effectLst/>
-        </p:spPr>
-        <p:style>
-          <a:lnRef idx="1">
-            <a:schemeClr val="accent2"/>
-          </a:lnRef>
-          <a:fillRef idx="2">
-            <a:schemeClr val="accent2"/>
-          </a:fillRef>
-          <a:effectRef idx="1">
-            <a:schemeClr val="accent2"/>
-          </a:effectRef>
-          <a:fontRef idx="minor">
-            <a:schemeClr val="dk1"/>
-          </a:fontRef>
-        </p:style>
-      </p:cxnSp>
-      <p:cxnSp>
-        <p:nvCxnSpPr>
-          <p:cNvPr id="107" name="Straight Arrow Connector 106"/>
-          <p:cNvCxnSpPr/>
-          <p:nvPr/>
-        </p:nvCxnSpPr>
-        <p:spPr>
-          <a:xfrm flipV="1">
-            <a:off x="6842003" y="1199445"/>
-            <a:ext cx="0" cy="304800"/>
-          </a:xfrm>
-          <a:prstGeom prst="straightConnector1">
-            <a:avLst/>
-          </a:prstGeom>
-          <a:ln w="19050">
-            <a:solidFill>
-              <a:schemeClr val="accent3"/>
-            </a:solidFill>
-            <a:prstDash val="dash"/>
-            <a:headEnd type="none" w="med" len="med"/>
-            <a:tailEnd type="arrow" w="med" len="med"/>
-          </a:ln>
-          <a:effectLst/>
-        </p:spPr>
-        <p:style>
-          <a:lnRef idx="1">
-            <a:schemeClr val="accent2"/>
-          </a:lnRef>
-          <a:fillRef idx="2">
-            <a:schemeClr val="accent2"/>
-          </a:fillRef>
-          <a:effectRef idx="1">
-            <a:schemeClr val="accent2"/>
-          </a:effectRef>
-          <a:fontRef idx="minor">
-            <a:schemeClr val="dk1"/>
-          </a:fontRef>
-        </p:style>
-      </p:cxnSp>
-      <p:cxnSp>
-        <p:nvCxnSpPr>
-          <p:cNvPr id="108" name="Straight Arrow Connector 107"/>
-          <p:cNvCxnSpPr/>
-          <p:nvPr/>
-        </p:nvCxnSpPr>
-        <p:spPr>
-          <a:xfrm flipV="1">
-            <a:off x="6994403" y="1199445"/>
-            <a:ext cx="0" cy="304800"/>
-          </a:xfrm>
-          <a:prstGeom prst="straightConnector1">
-            <a:avLst/>
-          </a:prstGeom>
-          <a:ln w="19050">
-            <a:solidFill>
-              <a:schemeClr val="accent3"/>
-            </a:solidFill>
-            <a:prstDash val="dash"/>
-            <a:headEnd type="none" w="med" len="med"/>
-            <a:tailEnd type="arrow" w="med" len="med"/>
-          </a:ln>
-          <a:effectLst/>
-        </p:spPr>
-        <p:style>
-          <a:lnRef idx="1">
-            <a:schemeClr val="accent2"/>
-          </a:lnRef>
-          <a:fillRef idx="2">
-            <a:schemeClr val="accent2"/>
-          </a:fillRef>
-          <a:effectRef idx="1">
-            <a:schemeClr val="accent2"/>
-          </a:effectRef>
-          <a:fontRef idx="minor">
-            <a:schemeClr val="dk1"/>
-          </a:fontRef>
-        </p:style>
-      </p:cxnSp>
-      <p:cxnSp>
-        <p:nvCxnSpPr>
-          <p:cNvPr id="109" name="Straight Arrow Connector 108"/>
-          <p:cNvCxnSpPr/>
-          <p:nvPr/>
-        </p:nvCxnSpPr>
-        <p:spPr>
-          <a:xfrm flipV="1">
-            <a:off x="7864446" y="1199445"/>
-            <a:ext cx="0" cy="304800"/>
-          </a:xfrm>
-          <a:prstGeom prst="straightConnector1">
-            <a:avLst/>
-          </a:prstGeom>
-          <a:ln w="19050">
-            <a:solidFill>
-              <a:schemeClr val="accent3"/>
-            </a:solidFill>
-            <a:prstDash val="dash"/>
-            <a:headEnd type="none" w="med" len="med"/>
-            <a:tailEnd type="arrow" w="med" len="med"/>
-          </a:ln>
-          <a:effectLst/>
-        </p:spPr>
-        <p:style>
-          <a:lnRef idx="1">
-            <a:schemeClr val="accent2"/>
-          </a:lnRef>
-          <a:fillRef idx="2">
-            <a:schemeClr val="accent2"/>
-          </a:fillRef>
-          <a:effectRef idx="1">
-            <a:schemeClr val="accent2"/>
-          </a:effectRef>
-          <a:fontRef idx="minor">
-            <a:schemeClr val="dk1"/>
-          </a:fontRef>
-        </p:style>
-      </p:cxnSp>
-      <p:cxnSp>
-        <p:nvCxnSpPr>
-          <p:cNvPr id="110" name="Straight Arrow Connector 109"/>
-          <p:cNvCxnSpPr/>
-          <p:nvPr/>
-        </p:nvCxnSpPr>
-        <p:spPr>
-          <a:xfrm flipV="1">
-            <a:off x="8016846" y="1199445"/>
-            <a:ext cx="0" cy="304800"/>
-          </a:xfrm>
-          <a:prstGeom prst="straightConnector1">
-            <a:avLst/>
-          </a:prstGeom>
-          <a:ln w="19050">
-            <a:solidFill>
-              <a:schemeClr val="accent3"/>
-            </a:solidFill>
-            <a:prstDash val="dash"/>
-            <a:headEnd type="none" w="med" len="med"/>
-            <a:tailEnd type="arrow" w="med" len="med"/>
-          </a:ln>
-          <a:effectLst/>
-        </p:spPr>
-        <p:style>
-          <a:lnRef idx="1">
-            <a:schemeClr val="accent2"/>
-          </a:lnRef>
-          <a:fillRef idx="2">
-            <a:schemeClr val="accent2"/>
-          </a:fillRef>
-          <a:effectRef idx="1">
-            <a:schemeClr val="accent2"/>
-          </a:effectRef>
-          <a:fontRef idx="minor">
-            <a:schemeClr val="dk1"/>
-          </a:fontRef>
-        </p:style>
-      </p:cxnSp>
-      <p:cxnSp>
-        <p:nvCxnSpPr>
-          <p:cNvPr id="111" name="Straight Arrow Connector 110"/>
-          <p:cNvCxnSpPr/>
-          <p:nvPr/>
-        </p:nvCxnSpPr>
-        <p:spPr>
-          <a:xfrm flipV="1">
-            <a:off x="8169246" y="1199445"/>
-            <a:ext cx="0" cy="304800"/>
-          </a:xfrm>
-          <a:prstGeom prst="straightConnector1">
-            <a:avLst/>
-          </a:prstGeom>
-          <a:ln w="19050">
-            <a:solidFill>
-              <a:schemeClr val="accent3"/>
-            </a:solidFill>
-            <a:prstDash val="dash"/>
-            <a:headEnd type="none" w="med" len="med"/>
-            <a:tailEnd type="arrow" w="med" len="med"/>
-          </a:ln>
-          <a:effectLst/>
-        </p:spPr>
-        <p:style>
-          <a:lnRef idx="1">
-            <a:schemeClr val="accent2"/>
-          </a:lnRef>
-          <a:fillRef idx="2">
-            <a:schemeClr val="accent2"/>
-          </a:fillRef>
-          <a:effectRef idx="1">
-            <a:schemeClr val="accent2"/>
-          </a:effectRef>
-          <a:fontRef idx="minor">
-            <a:schemeClr val="dk1"/>
-          </a:fontRef>
-        </p:style>
-      </p:cxnSp>
+      </p:pic>
     </p:spTree>
     <p:extLst>
       <p:ext uri="{BB962C8B-B14F-4D97-AF65-F5344CB8AC3E}">
-        <p14:creationId xmlns:p14="http://schemas.microsoft.com/office/powerpoint/2010/main" val="3376861716"/>
+        <p14:creationId xmlns:p14="http://schemas.microsoft.com/office/powerpoint/2010/main" val="424238335"/>
       </p:ext>
     </p:extLst>
   </p:cSld>

</xml_diff>